<commit_message>
Atualizacao funcionario e ppt
</commit_message>
<xml_diff>
--- a/Trabalho Base de dados.pptx
+++ b/Trabalho Base de dados.pptx
@@ -131,9 +131,14 @@
 <file path=ppt/revisionInfo.xml><?xml version="1.0" encoding="utf-8"?>
 <p1510:revInfo xmlns:a="http://schemas.openxmlformats.org/drawingml/2006/main" xmlns:r="http://schemas.openxmlformats.org/officeDocument/2006/relationships" xmlns:p1510="http://schemas.microsoft.com/office/powerpoint/2015/10/main">
   <p1510:revLst>
+    <p1510:client id="{488DADE7-AD0D-4CB9-978C-288F59B720B7}" v="16" dt="2022-11-21T13:58:42.924"/>
     <p1510:client id="{4F2D0BBB-745E-4437-BF3A-D1335A31CBB8}" v="147" dt="2022-11-12T15:52:58.572"/>
+    <p1510:client id="{7371EA1F-2000-45DC-B844-A00A30F08F62}" v="16" dt="2022-11-21T20:28:31.239"/>
+    <p1510:client id="{9A88B317-CBAB-4FA8-AFD2-F4E7D495E8F0}" v="14" dt="2022-11-18T22:16:47.210"/>
     <p1510:client id="{A08D5FAF-9840-4B4D-AA9A-2ACA838A83F1}" v="372" dt="2022-11-12T16:14:22.310"/>
     <p1510:client id="{A28470A4-7179-4318-99B0-1D8523CCD41B}" v="422" dt="2022-11-12T16:13:02.356"/>
+    <p1510:client id="{DBDBD402-E6FC-45DD-8377-FCF5A949006F}" v="7" dt="2022-11-18T21:18:01.738"/>
+    <p1510:client id="{F50F53C7-0BFE-4944-86E7-F15EF1CE1D65}" v="17" dt="2022-11-12T16:18:43.529"/>
   </p1510:revLst>
 </p1510:revInfo>
 </file>
@@ -414,7 +419,7 @@
           </a:lstStyle>
           <a:p>
             <a:r>
-              <a:rPr lang="en-US" dirty="0"/>
+              <a:rPr lang="en-US"/>
               <a:t>Click to edit Master subtitle style</a:t>
             </a:r>
           </a:p>
@@ -453,7 +458,7 @@
             <a:fld id="{73C3BD54-29B9-3D42-B178-776ED395AA85}" type="datetimeFigureOut">
               <a:rPr lang="en-US" smtClean="0"/>
               <a:pPr/>
-              <a:t>11/12/2022</a:t>
+              <a:t>11/21/2022</a:t>
             </a:fld>
             <a:endParaRPr lang="en-US" sz="1400"/>
           </a:p>
@@ -703,7 +708,7 @@
           <a:p>
             <a:fld id="{73C3BD54-29B9-3D42-B178-776ED395AA85}" type="datetimeFigureOut">
               <a:rPr lang="en-US" smtClean="0"/>
-              <a:t>11/12/2022</a:t>
+              <a:t>11/21/2022</a:t>
             </a:fld>
             <a:endParaRPr lang="en-US"/>
           </a:p>
@@ -1017,7 +1022,7 @@
           <a:p>
             <a:fld id="{73C3BD54-29B9-3D42-B178-776ED395AA85}" type="datetimeFigureOut">
               <a:rPr lang="en-US" smtClean="0"/>
-              <a:t>11/12/2022</a:t>
+              <a:t>11/21/2022</a:t>
             </a:fld>
             <a:endParaRPr lang="en-US"/>
           </a:p>
@@ -1531,7 +1536,7 @@
           <a:p>
             <a:fld id="{73C3BD54-29B9-3D42-B178-776ED395AA85}" type="datetimeFigureOut">
               <a:rPr lang="en-US" smtClean="0"/>
-              <a:t>11/12/2022</a:t>
+              <a:t>11/21/2022</a:t>
             </a:fld>
             <a:endParaRPr lang="en-US"/>
           </a:p>
@@ -1810,7 +1815,7 @@
           </a:lstStyle>
           <a:p>
             <a:r>
-              <a:rPr lang="en-US" dirty="0"/>
+              <a:rPr lang="en-US"/>
               <a:t>Click to edit Master title style</a:t>
             </a:r>
           </a:p>
@@ -1962,7 +1967,7 @@
           <a:p>
             <a:fld id="{73C3BD54-29B9-3D42-B178-776ED395AA85}" type="datetimeFigureOut">
               <a:rPr lang="en-US" smtClean="0"/>
-              <a:t>11/12/2022</a:t>
+              <a:t>11/21/2022</a:t>
             </a:fld>
             <a:endParaRPr lang="en-US"/>
           </a:p>
@@ -2227,7 +2232,7 @@
           <a:p>
             <a:fld id="{73C3BD54-29B9-3D42-B178-776ED395AA85}" type="datetimeFigureOut">
               <a:rPr lang="en-US" smtClean="0"/>
-              <a:t>11/12/2022</a:t>
+              <a:t>11/21/2022</a:t>
             </a:fld>
             <a:endParaRPr lang="en-US"/>
           </a:p>
@@ -2577,7 +2582,7 @@
           <a:p>
             <a:pPr lvl="0"/>
             <a:r>
-              <a:rPr lang="en-US" dirty="0"/>
+              <a:rPr lang="en-US"/>
               <a:t>Click to edit Master text styles</a:t>
             </a:r>
           </a:p>
@@ -2801,7 +2806,7 @@
           <a:p>
             <a:fld id="{73C3BD54-29B9-3D42-B178-776ED395AA85}" type="datetimeFigureOut">
               <a:rPr lang="en-US" smtClean="0"/>
-              <a:t>11/12/2022</a:t>
+              <a:t>11/21/2022</a:t>
             </a:fld>
             <a:endParaRPr lang="en-US"/>
           </a:p>
@@ -3104,7 +3109,7 @@
           <a:p>
             <a:fld id="{73C3BD54-29B9-3D42-B178-776ED395AA85}" type="datetimeFigureOut">
               <a:rPr lang="en-US" smtClean="0"/>
-              <a:t>11/12/2022</a:t>
+              <a:t>11/21/2022</a:t>
             </a:fld>
             <a:endParaRPr lang="en-US"/>
           </a:p>
@@ -3379,7 +3384,7 @@
           <a:p>
             <a:fld id="{73C3BD54-29B9-3D42-B178-776ED395AA85}" type="datetimeFigureOut">
               <a:rPr lang="en-US" smtClean="0"/>
-              <a:t>11/12/2022</a:t>
+              <a:t>11/21/2022</a:t>
             </a:fld>
             <a:endParaRPr lang="en-US"/>
           </a:p>
@@ -3660,7 +3665,7 @@
           </a:lstStyle>
           <a:p>
             <a:r>
-              <a:rPr lang="en-US" dirty="0"/>
+              <a:rPr lang="en-US"/>
               <a:t>Click to edit Master title style</a:t>
             </a:r>
           </a:p>
@@ -3722,35 +3727,35 @@
           <a:p>
             <a:pPr lvl="0"/>
             <a:r>
-              <a:rPr lang="en-US" dirty="0"/>
+              <a:rPr lang="en-US"/>
               <a:t>Click to edit Master text styles</a:t>
             </a:r>
           </a:p>
           <a:p>
             <a:pPr lvl="1"/>
             <a:r>
-              <a:rPr lang="en-US" dirty="0"/>
+              <a:rPr lang="en-US"/>
               <a:t>Second level</a:t>
             </a:r>
           </a:p>
           <a:p>
             <a:pPr lvl="2"/>
             <a:r>
-              <a:rPr lang="en-US" dirty="0"/>
+              <a:rPr lang="en-US"/>
               <a:t>Third level</a:t>
             </a:r>
           </a:p>
           <a:p>
             <a:pPr lvl="3"/>
             <a:r>
-              <a:rPr lang="en-US" dirty="0"/>
+              <a:rPr lang="en-US"/>
               <a:t>Fourth level</a:t>
             </a:r>
           </a:p>
           <a:p>
             <a:pPr lvl="4"/>
             <a:r>
-              <a:rPr lang="en-US" dirty="0"/>
+              <a:rPr lang="en-US"/>
               <a:t>Fifth level</a:t>
             </a:r>
           </a:p>
@@ -3850,7 +3855,7 @@
           <a:p>
             <a:fld id="{73C3BD54-29B9-3D42-B178-776ED395AA85}" type="datetimeFigureOut">
               <a:rPr lang="en-US" smtClean="0"/>
-              <a:t>11/12/2022</a:t>
+              <a:t>11/21/2022</a:t>
             </a:fld>
             <a:endParaRPr lang="en-US"/>
           </a:p>
@@ -4301,7 +4306,7 @@
           <a:p>
             <a:fld id="{73C3BD54-29B9-3D42-B178-776ED395AA85}" type="datetimeFigureOut">
               <a:rPr lang="en-US" smtClean="0"/>
-              <a:t>11/12/2022</a:t>
+              <a:t>11/21/2022</a:t>
             </a:fld>
             <a:endParaRPr lang="en-US"/>
           </a:p>
@@ -4625,35 +4630,35 @@
           <a:p>
             <a:pPr lvl="0"/>
             <a:r>
-              <a:rPr lang="en-US" dirty="0"/>
+              <a:rPr lang="en-US"/>
               <a:t>Click to edit Master text styles</a:t>
             </a:r>
           </a:p>
           <a:p>
             <a:pPr lvl="1"/>
             <a:r>
-              <a:rPr lang="en-US" dirty="0"/>
+              <a:rPr lang="en-US"/>
               <a:t>Second level</a:t>
             </a:r>
           </a:p>
           <a:p>
             <a:pPr lvl="2"/>
             <a:r>
-              <a:rPr lang="en-US" dirty="0"/>
+              <a:rPr lang="en-US"/>
               <a:t>Third level</a:t>
             </a:r>
           </a:p>
           <a:p>
             <a:pPr lvl="3"/>
             <a:r>
-              <a:rPr lang="en-US" dirty="0"/>
+              <a:rPr lang="en-US"/>
               <a:t>Fourth level</a:t>
             </a:r>
           </a:p>
           <a:p>
             <a:pPr lvl="4"/>
             <a:r>
-              <a:rPr lang="en-US" dirty="0"/>
+              <a:rPr lang="en-US"/>
               <a:t>Fifth level</a:t>
             </a:r>
           </a:p>
@@ -4697,9 +4702,9 @@
             <a:fld id="{73C3BD54-29B9-3D42-B178-776ED395AA85}" type="datetimeFigureOut">
               <a:rPr lang="en-US" smtClean="0"/>
               <a:pPr/>
-              <a:t>11/12/2022</a:t>
+              <a:t>11/21/2022</a:t>
             </a:fld>
-            <a:endParaRPr lang="en-US" dirty="0"/>
+            <a:endParaRPr lang="en-US"/>
           </a:p>
         </p:txBody>
       </p:sp>
@@ -4738,7 +4743,7 @@
             </a:lvl1pPr>
           </a:lstStyle>
           <a:p>
-            <a:endParaRPr lang="en-US" dirty="0"/>
+            <a:endParaRPr lang="en-US"/>
           </a:p>
         </p:txBody>
       </p:sp>
@@ -5259,23 +5264,34 @@
         </p:spPr>
         <p:txBody>
           <a:bodyPr vert="horz" lIns="91440" tIns="45720" rIns="91440" bIns="45720" rtlCol="0" anchor="t">
-            <a:normAutofit/>
+            <a:normAutofit fontScale="90000"/>
           </a:bodyPr>
           <a:lstStyle/>
           <a:p>
             <a:r>
-              <a:rPr lang="pt-PT" i="1" spc="0" dirty="0">
+              <a:rPr lang="pt-PT" i="1" spc="0">
                 <a:latin typeface="Franklin Gothic Heavy"/>
               </a:rPr>
+              <a:t>Trabalho Prático</a:t>
+            </a:r>
+            <a:br>
+              <a:rPr lang="pt-PT" i="1" spc="0">
+                <a:latin typeface="Franklin Gothic Heavy"/>
+              </a:rPr>
+            </a:br>
+            <a:r>
+              <a:rPr lang="pt-PT" i="1" spc="0">
+                <a:latin typeface="Franklin Gothic Heavy"/>
+              </a:rPr>
               <a:t>Base de Dados</a:t>
             </a:r>
             <a:br>
-              <a:rPr lang="pt-PT" i="1" spc="0" dirty="0">
+              <a:rPr lang="pt-PT" i="1" spc="0">
                 <a:latin typeface="Franklin Gothic Heavy"/>
               </a:rPr>
             </a:br>
             <a:r>
-              <a:rPr lang="pt-PT" i="1" spc="0" dirty="0">
+              <a:rPr lang="pt-PT" i="1" spc="0">
                 <a:solidFill>
                   <a:srgbClr val="000000"/>
                 </a:solidFill>
@@ -5283,7 +5299,7 @@
               </a:rPr>
               <a:t>22/23</a:t>
             </a:r>
-            <a:endParaRPr lang="pt-PT" b="0" i="1" cap="none" spc="0" dirty="0">
+            <a:endParaRPr lang="pt-PT" b="0" i="1" cap="none" spc="0">
               <a:solidFill>
                 <a:schemeClr val="bg1"/>
               </a:solidFill>
@@ -5304,7 +5320,7 @@
         </p:nvSpPr>
         <p:spPr>
           <a:xfrm>
-            <a:off x="797104" y="4466845"/>
+            <a:off x="797104" y="4664767"/>
             <a:ext cx="10601135" cy="882904"/>
           </a:xfrm>
         </p:spPr>
@@ -5315,7 +5331,7 @@
           <a:lstStyle/>
           <a:p>
             <a:r>
-              <a:rPr lang="pt-PT" dirty="0"/>
+              <a:rPr lang="pt-PT"/>
               <a:t>Checkpoint 1 e 2</a:t>
             </a:r>
           </a:p>
@@ -5771,13 +5787,13 @@
           <a:lstStyle/>
           <a:p>
             <a:r>
-              <a:rPr lang="pt-BR" dirty="0">
+              <a:rPr lang="pt-BR">
                 <a:ea typeface="+mj-lt"/>
                 <a:cs typeface="+mj-lt"/>
               </a:rPr>
               <a:t>2.2.1 Requisitos de descrição</a:t>
             </a:r>
-            <a:endParaRPr lang="pt-PT" dirty="0"/>
+            <a:endParaRPr lang="pt-PT"/>
           </a:p>
         </p:txBody>
       </p:sp>
@@ -5816,27 +5832,27 @@
               <a:buAutoNum type="arabicPeriod"/>
             </a:pPr>
             <a:r>
-              <a:rPr lang="pt-BR" sz="1700" dirty="0">
+              <a:rPr lang="pt-BR" sz="1700">
                 <a:ea typeface="+mn-lt"/>
                 <a:cs typeface="+mn-lt"/>
               </a:rPr>
               <a:t>Cada pedido deve conter o seu número de pedido, endereço de entrega, data do pedido/envio/entrega, cliente associado, o estado, possíveis cupões e por fim os preços com/sem </a:t>
             </a:r>
             <a:r>
-              <a:rPr lang="pt-BR" sz="1700" dirty="0" err="1">
+              <a:rPr lang="pt-BR" sz="1700" err="1">
                 <a:ea typeface="+mn-lt"/>
                 <a:cs typeface="+mn-lt"/>
               </a:rPr>
               <a:t>Iva</a:t>
             </a:r>
             <a:r>
-              <a:rPr lang="pt-BR" sz="1700" dirty="0">
+              <a:rPr lang="pt-BR" sz="1700">
                 <a:ea typeface="+mn-lt"/>
                 <a:cs typeface="+mn-lt"/>
               </a:rPr>
               <a:t>.</a:t>
             </a:r>
-            <a:endParaRPr lang="pt-BR" sz="1700" dirty="0"/>
+            <a:endParaRPr lang="pt-BR" sz="1700"/>
           </a:p>
           <a:p>
             <a:pPr marL="457200" indent="-457200">
@@ -5846,21 +5862,21 @@
               <a:buAutoNum type="arabicPeriod"/>
             </a:pPr>
             <a:r>
-              <a:rPr lang="pt-BR" sz="1700" dirty="0">
+              <a:rPr lang="pt-BR" sz="1700">
                 <a:ea typeface="+mn-lt"/>
                 <a:cs typeface="+mn-lt"/>
               </a:rPr>
               <a:t>Cada cliente possui o seu número de identificação, nome, </a:t>
             </a:r>
             <a:r>
-              <a:rPr lang="pt-PT" sz="1700" dirty="0">
+              <a:rPr lang="pt-PT" sz="1700">
                 <a:ea typeface="+mn-lt"/>
                 <a:cs typeface="+mn-lt"/>
               </a:rPr>
               <a:t>email</a:t>
             </a:r>
             <a:r>
-              <a:rPr lang="pt-BR" sz="1700" dirty="0">
+              <a:rPr lang="pt-BR" sz="1700">
                 <a:ea typeface="+mn-lt"/>
                 <a:cs typeface="+mn-lt"/>
               </a:rPr>
@@ -5875,7 +5891,7 @@
               <a:buAutoNum type="arabicPeriod"/>
             </a:pPr>
             <a:r>
-              <a:rPr lang="pt-BR" sz="1700" dirty="0">
+              <a:rPr lang="pt-BR" sz="1700">
                 <a:ea typeface="+mn-lt"/>
                 <a:cs typeface="+mn-lt"/>
               </a:rPr>
@@ -5890,7 +5906,7 @@
               <a:buAutoNum type="arabicPeriod"/>
             </a:pPr>
             <a:r>
-              <a:rPr lang="pt-BR" sz="1700" dirty="0">
+              <a:rPr lang="pt-BR" sz="1700">
                 <a:ea typeface="+mn-lt"/>
                 <a:cs typeface="+mn-lt"/>
               </a:rPr>
@@ -5905,7 +5921,7 @@
               <a:buAutoNum type="arabicPeriod"/>
             </a:pPr>
             <a:r>
-              <a:rPr lang="pt-BR" sz="1700" dirty="0">
+              <a:rPr lang="pt-BR" sz="1700">
                 <a:ea typeface="+mn-lt"/>
                 <a:cs typeface="+mn-lt"/>
               </a:rPr>
@@ -5920,7 +5936,7 @@
               <a:buAutoNum type="arabicPeriod"/>
             </a:pPr>
             <a:r>
-              <a:rPr lang="pt-BR" sz="1700" dirty="0">
+              <a:rPr lang="pt-BR" sz="1700">
                 <a:ea typeface="+mn-lt"/>
                 <a:cs typeface="+mn-lt"/>
               </a:rPr>
@@ -6285,7 +6301,7 @@
               <a:buAutoNum type="arabicPeriod"/>
             </a:pPr>
             <a:r>
-              <a:rPr lang="pt-BR" dirty="0">
+              <a:rPr lang="pt-BR">
                 <a:ea typeface="+mn-lt"/>
                 <a:cs typeface="+mn-lt"/>
               </a:rPr>
@@ -6297,7 +6313,7 @@
               <a:buAutoNum type="arabicPeriod"/>
             </a:pPr>
             <a:r>
-              <a:rPr lang="pt-BR" dirty="0">
+              <a:rPr lang="pt-BR">
                 <a:ea typeface="+mn-lt"/>
                 <a:cs typeface="+mn-lt"/>
               </a:rPr>
@@ -6308,7 +6324,7 @@
             <a:pPr marL="457200" indent="-457200">
               <a:buAutoNum type="arabicPeriod"/>
             </a:pPr>
-            <a:endParaRPr lang="pt-BR" dirty="0"/>
+            <a:endParaRPr lang="pt-BR"/>
           </a:p>
         </p:txBody>
       </p:sp>
@@ -6659,7 +6675,7 @@
           </a:xfrm>
         </p:spPr>
         <p:txBody>
-          <a:bodyPr vert="horz" lIns="91440" tIns="45720" rIns="91440" bIns="45720" rtlCol="0">
+          <a:bodyPr vert="horz" lIns="91440" tIns="45720" rIns="91440" bIns="45720" rtlCol="0" anchor="t">
             <a:normAutofit/>
           </a:bodyPr>
           <a:lstStyle/>
@@ -6671,13 +6687,13 @@
               <a:buAutoNum type="arabicPeriod"/>
             </a:pPr>
             <a:r>
-              <a:rPr lang="pt-BR" sz="1900">
+              <a:rPr lang="pt-BR" sz="1900" dirty="0">
                 <a:ea typeface="+mn-lt"/>
                 <a:cs typeface="+mn-lt"/>
               </a:rPr>
               <a:t>O cliente tem um intervalo de tempo de 2 horas em que pode cancelar o pedido e ser reembolsado.</a:t>
             </a:r>
-            <a:endParaRPr lang="pt-BR" sz="1900"/>
+            <a:endParaRPr lang="pt-BR" sz="1900" dirty="0"/>
           </a:p>
           <a:p>
             <a:pPr marL="457200" indent="-457200">
@@ -6687,7 +6703,7 @@
               <a:buAutoNum type="arabicPeriod"/>
             </a:pPr>
             <a:r>
-              <a:rPr lang="pt-BR" sz="1900">
+              <a:rPr lang="pt-BR" sz="1900" dirty="0">
                 <a:ea typeface="+mn-lt"/>
                 <a:cs typeface="+mn-lt"/>
               </a:rPr>
@@ -6702,25 +6718,11 @@
               <a:buAutoNum type="arabicPeriod"/>
             </a:pPr>
             <a:r>
-              <a:rPr lang="pt-BR" sz="1900">
+              <a:rPr lang="pt-BR" sz="1900" dirty="0">
                 <a:ea typeface="+mn-lt"/>
                 <a:cs typeface="+mn-lt"/>
               </a:rPr>
-              <a:t>Os clientes podem adicionar os </a:t>
-            </a:r>
-            <a:r>
-              <a:rPr lang="pt-BR" sz="1900" err="1">
-                <a:ea typeface="+mn-lt"/>
-                <a:cs typeface="+mn-lt"/>
-              </a:rPr>
-              <a:t>items</a:t>
-            </a:r>
-            <a:r>
-              <a:rPr lang="pt-BR" sz="1900">
-                <a:ea typeface="+mn-lt"/>
-                <a:cs typeface="+mn-lt"/>
-              </a:rPr>
-              <a:t> que pretender a um pedido.</a:t>
+              <a:t>Os clientes podem adicionar os itens que pretender a um pedido.</a:t>
             </a:r>
           </a:p>
           <a:p>
@@ -6731,25 +6733,11 @@
               <a:buAutoNum type="arabicPeriod"/>
             </a:pPr>
             <a:r>
-              <a:rPr lang="pt-BR" sz="1900">
+              <a:rPr lang="pt-BR" sz="1900" dirty="0">
                 <a:ea typeface="+mn-lt"/>
                 <a:cs typeface="+mn-lt"/>
               </a:rPr>
-              <a:t>A quantidade dos </a:t>
-            </a:r>
-            <a:r>
-              <a:rPr lang="pt-BR" sz="1900" err="1">
-                <a:ea typeface="+mn-lt"/>
-                <a:cs typeface="+mn-lt"/>
-              </a:rPr>
-              <a:t>items</a:t>
-            </a:r>
-            <a:r>
-              <a:rPr lang="pt-BR" sz="1900">
-                <a:ea typeface="+mn-lt"/>
-                <a:cs typeface="+mn-lt"/>
-              </a:rPr>
-              <a:t> são controlados pelos repositores e administrativos.</a:t>
+              <a:t>A quantidade dos itens são controlados pelos repositores e administrativos.</a:t>
             </a:r>
           </a:p>
           <a:p>
@@ -6760,39 +6748,11 @@
               <a:buAutoNum type="arabicPeriod"/>
             </a:pPr>
             <a:r>
-              <a:rPr lang="pt-BR" sz="1900">
+              <a:rPr lang="pt-BR" sz="1900" dirty="0">
                 <a:ea typeface="+mn-lt"/>
                 <a:cs typeface="+mn-lt"/>
               </a:rPr>
-              <a:t>Os administrativos podem atualizar o </a:t>
-            </a:r>
-            <a:r>
-              <a:rPr lang="pt-BR" sz="1900" err="1">
-                <a:ea typeface="+mn-lt"/>
-                <a:cs typeface="+mn-lt"/>
-              </a:rPr>
-              <a:t>sálario</a:t>
-            </a:r>
-            <a:r>
-              <a:rPr lang="pt-BR" sz="1900">
-                <a:ea typeface="+mn-lt"/>
-                <a:cs typeface="+mn-lt"/>
-              </a:rPr>
-              <a:t> dos funcionários, alterar o estado dos pedidos e adicionar novos </a:t>
-            </a:r>
-            <a:r>
-              <a:rPr lang="pt-BR" sz="1900" err="1">
-                <a:ea typeface="+mn-lt"/>
-                <a:cs typeface="+mn-lt"/>
-              </a:rPr>
-              <a:t>items</a:t>
-            </a:r>
-            <a:r>
-              <a:rPr lang="pt-BR" sz="1900">
-                <a:ea typeface="+mn-lt"/>
-                <a:cs typeface="+mn-lt"/>
-              </a:rPr>
-              <a:t>.</a:t>
+              <a:t>Os administrativos podem atualizar o salário dos funcionários, alterar o estado dos pedidos e adicionar novos itens.</a:t>
             </a:r>
           </a:p>
           <a:p>
@@ -6803,27 +6763,13 @@
               <a:buAutoNum type="arabicPeriod"/>
             </a:pPr>
             <a:r>
-              <a:rPr lang="pt-BR" sz="1900">
+              <a:rPr lang="pt-BR" sz="1900" dirty="0">
                 <a:ea typeface="+mn-lt"/>
                 <a:cs typeface="+mn-lt"/>
               </a:rPr>
-              <a:t>Deve ser possível adicionar novos armazéns, funcionários, clientes e pedidos pelos </a:t>
-            </a:r>
-            <a:r>
-              <a:rPr lang="pt-BR" sz="1900" err="1">
-                <a:ea typeface="+mn-lt"/>
-                <a:cs typeface="+mn-lt"/>
-              </a:rPr>
-              <a:t>funcionarios</a:t>
-            </a:r>
-            <a:r>
-              <a:rPr lang="pt-BR" sz="1900">
-                <a:ea typeface="+mn-lt"/>
-                <a:cs typeface="+mn-lt"/>
-              </a:rPr>
-              <a:t> administrativos.</a:t>
-            </a:r>
-            <a:endParaRPr lang="pt-BR" sz="1900"/>
+              <a:t>Deve ser possível adicionar novos armazéns, funcionários, clientes e pedidos pelos funcionários administrativos.</a:t>
+            </a:r>
+            <a:endParaRPr lang="pt-BR" sz="1900" dirty="0"/>
           </a:p>
         </p:txBody>
       </p:sp>
@@ -7746,10 +7692,10 @@
       </p:sp>
       <p:pic>
         <p:nvPicPr>
-          <p:cNvPr id="4" name="Imagem 4">
-            <a:extLst>
-              <a:ext uri="{FF2B5EF4-FFF2-40B4-BE49-F238E27FC236}">
-                <a16:creationId xmlns:a16="http://schemas.microsoft.com/office/drawing/2014/main" id="{4A6F34BA-B976-7D5D-8433-0C135C0475FA}"/>
+          <p:cNvPr id="2" name="Imagem 2">
+            <a:extLst>
+              <a:ext uri="{FF2B5EF4-FFF2-40B4-BE49-F238E27FC236}">
+                <a16:creationId xmlns:a16="http://schemas.microsoft.com/office/drawing/2014/main" id="{06921C93-2E2C-A48C-4C61-21AB63855610}"/>
               </a:ext>
             </a:extLst>
           </p:cNvPr>
@@ -7758,15 +7704,16 @@
           </p:cNvPicPr>
           <p:nvPr/>
         </p:nvPicPr>
-        <p:blipFill rotWithShape="1">
+        <p:blipFill>
           <a:blip r:embed="rId2"/>
-          <a:srcRect/>
-          <a:stretch/>
+          <a:stretch>
+            <a:fillRect/>
+          </a:stretch>
         </p:blipFill>
         <p:spPr>
           <a:xfrm>
-            <a:off x="20" y="10"/>
-            <a:ext cx="12191980" cy="6857990"/>
+            <a:off x="3958" y="363182"/>
+            <a:ext cx="12187707" cy="5893988"/>
           </a:xfrm>
           <a:prstGeom prst="rect">
             <a:avLst/>
@@ -8347,7 +8294,7 @@
         </p:blipFill>
         <p:spPr>
           <a:xfrm>
-            <a:off x="2146" y="3577"/>
+            <a:off x="2147" y="3577"/>
             <a:ext cx="12187706" cy="6850845"/>
           </a:xfrm>
           <a:prstGeom prst="rect">
@@ -8407,7 +8354,7 @@
           <a:lstStyle/>
           <a:p>
             <a:r>
-              <a:rPr lang="pt-PT" dirty="0"/>
+              <a:rPr lang="pt-PT"/>
               <a:t>1. Definição do Sistema</a:t>
             </a:r>
           </a:p>
@@ -8437,7 +8384,7 @@
           <a:lstStyle/>
           <a:p>
             <a:r>
-              <a:rPr lang="pt-PT" dirty="0">
+              <a:rPr lang="pt-PT">
                 <a:ea typeface="+mn-lt"/>
                 <a:cs typeface="+mn-lt"/>
               </a:rPr>
@@ -8446,7 +8393,7 @@
           </a:p>
           <a:p>
             <a:r>
-              <a:rPr lang="pt-PT" dirty="0">
+              <a:rPr lang="pt-PT">
                 <a:ea typeface="+mn-lt"/>
                 <a:cs typeface="+mn-lt"/>
               </a:rPr>
@@ -8455,33 +8402,25 @@
           </a:p>
           <a:p>
             <a:r>
-              <a:rPr lang="pt-PT" dirty="0">
+              <a:rPr lang="pt-PT">
                 <a:ea typeface="+mn-lt"/>
                 <a:cs typeface="+mn-lt"/>
               </a:rPr>
               <a:t>1.3 Análise da viabilidade do processo </a:t>
             </a:r>
-            <a:endParaRPr lang="pt-PT">
-              <a:ea typeface="+mn-lt"/>
-              <a:cs typeface="+mn-lt"/>
-            </a:endParaRPr>
-          </a:p>
-          <a:p>
-            <a:r>
-              <a:rPr lang="pt-PT" dirty="0">
+          </a:p>
+          <a:p>
+            <a:r>
+              <a:rPr lang="pt-PT">
                 <a:ea typeface="+mn-lt"/>
                 <a:cs typeface="+mn-lt"/>
               </a:rPr>
               <a:t>1.4 Recursos e Equipa de Trabalho </a:t>
             </a:r>
-            <a:endParaRPr lang="pt-PT">
-              <a:ea typeface="+mn-lt"/>
-              <a:cs typeface="+mn-lt"/>
-            </a:endParaRPr>
-          </a:p>
-          <a:p>
-            <a:r>
-              <a:rPr lang="pt-PT" dirty="0">
+          </a:p>
+          <a:p>
+            <a:r>
+              <a:rPr lang="pt-PT">
                 <a:ea typeface="+mn-lt"/>
                 <a:cs typeface="+mn-lt"/>
               </a:rPr>
@@ -8543,13 +8482,13 @@
           <a:lstStyle/>
           <a:p>
             <a:r>
-              <a:rPr lang="pt-PT" dirty="0">
+              <a:rPr lang="pt-PT">
                 <a:ea typeface="+mj-lt"/>
                 <a:cs typeface="+mj-lt"/>
               </a:rPr>
               <a:t>1.1 Contexto de aplicação e fundamentação do sistema </a:t>
             </a:r>
-            <a:endParaRPr lang="pt-PT" dirty="0"/>
+            <a:endParaRPr lang="pt-PT"/>
           </a:p>
         </p:txBody>
       </p:sp>
@@ -8587,7 +8526,7 @@
               <a:t>A AmazoniaTM é uma empresa com sede em Lisboa. Foi fundada em Janeiro de 2018 pelo Sr. Jefferson Bazos percebendo a inexistência de uma Amazon em Portugal, viu uma grande oportunidade de negócio, de modo a proporcionar uma entrega satisfatória. Dois anos apos ter idealizado o projeto e procura dos fundos, finalmente inaugurou a “AmazoniaTM”.</a:t>
             </a:r>
             <a:r>
-              <a:rPr lang="pt-PT" dirty="0">
+              <a:rPr lang="pt-PT">
                 <a:ea typeface="+mn-lt"/>
                 <a:cs typeface="+mn-lt"/>
               </a:rPr>
@@ -8604,10 +8543,10 @@
                 <a:ea typeface="+mn-lt"/>
                 <a:cs typeface="+mn-lt"/>
               </a:rPr>
-              <a:t>Nos primeiros meses o negócio estava a ter sucesso, esta evolução chegou ao ponto em que o número de clientes era excessiva para as condições verificadas, visto que só existia armazéns na zona de Lisboa. Com o intuito de proporcionar tempos de entrega menores em outras zonas do país, tais como, Coimbra, Porto e Braga, decidiu expandir para essas localizações. Em cada um dos armazéns existem 21 funcionários, sendo eles 1 gestor, 10 distribuidores e 10 repositores.</a:t>
-            </a:r>
-            <a:r>
-              <a:rPr lang="pt-PT" dirty="0">
+              <a:t>Nos primeiros meses o negócio estava a ter sucesso, esta evolução chegou ao ponto em que o número de clientes era excessivo para as condições verificadas, visto que só existia armazéns na zona de Lisboa. Com o intuito de proporcionar tempos de entrega menores em outras zonas do país, tais como, Coimbra, Porto e Braga, decidiu expandir para essas localizações. Em cada um dos armazéns existem 21 funcionários, sendo eles 1 gestor, 10 distribuidores e 10 repositores.</a:t>
+            </a:r>
+            <a:r>
+              <a:rPr lang="pt-PT">
                 <a:ea typeface="+mn-lt"/>
                 <a:cs typeface="+mn-lt"/>
               </a:rPr>
@@ -8640,7 +8579,7 @@
               <a:t>Assim, para resolver esta situação, por sugestão do Joaquim, recorreu aos nossos serviços para a elaboração de um sistema de base de dados capaz de reverter a situação em que se encontra a “AmazoniaTM”.</a:t>
             </a:r>
             <a:r>
-              <a:rPr lang="pt-PT" dirty="0">
+              <a:rPr lang="pt-PT">
                 <a:ea typeface="+mn-lt"/>
                 <a:cs typeface="+mn-lt"/>
               </a:rPr>
@@ -8705,13 +8644,13 @@
           <a:lstStyle/>
           <a:p>
             <a:r>
-              <a:rPr lang="pt-PT" dirty="0">
+              <a:rPr lang="pt-PT">
                 <a:ea typeface="+mj-lt"/>
                 <a:cs typeface="+mj-lt"/>
               </a:rPr>
               <a:t>1.2 Motivação e Objetivos do Trabalho</a:t>
             </a:r>
-            <a:endParaRPr lang="pt-PT" dirty="0"/>
+            <a:endParaRPr lang="pt-PT"/>
           </a:p>
         </p:txBody>
       </p:sp>
@@ -8762,7 +8701,7 @@
               <a:t>- Melhoria da estruturação do seu modelo de negócio, bem como melhorar a capacidade de gerir cada armazém e o registo da movimentação da mercadoria.</a:t>
             </a:r>
             <a:r>
-              <a:rPr lang="pt-PT" dirty="0">
+              <a:rPr lang="pt-PT">
                 <a:ea typeface="+mn-lt"/>
                 <a:cs typeface="+mn-lt"/>
               </a:rPr>
@@ -8782,7 +8721,7 @@
               <a:t>- Facilitação na obtenção de informação sobre os clientes, através da implementação de mecanismos de análise de vendas e de profiling de clientes;</a:t>
             </a:r>
             <a:r>
-              <a:rPr lang="pt-PT" dirty="0">
+              <a:rPr lang="pt-PT">
                 <a:ea typeface="+mn-lt"/>
                 <a:cs typeface="+mn-lt"/>
               </a:rPr>
@@ -8815,7 +8754,7 @@
               <a:t>- Organizar as finanças de forma a diminuir os gastos;</a:t>
             </a:r>
             <a:r>
-              <a:rPr lang="pt-PT" dirty="0">
+              <a:rPr lang="pt-PT">
                 <a:ea typeface="+mn-lt"/>
                 <a:cs typeface="+mn-lt"/>
               </a:rPr>
@@ -8835,7 +8774,7 @@
               <a:t>- Reduzir o tempo de entrega;</a:t>
             </a:r>
             <a:r>
-              <a:rPr lang="pt-PT" dirty="0">
+              <a:rPr lang="pt-PT">
                 <a:ea typeface="+mn-lt"/>
                 <a:cs typeface="+mn-lt"/>
               </a:rPr>
@@ -8855,7 +8794,7 @@
               <a:t>- Implementação de um sistema de recompensas para os funcionários exemplares.</a:t>
             </a:r>
             <a:r>
-              <a:rPr lang="pt-PT" dirty="0">
+              <a:rPr lang="pt-PT">
                 <a:ea typeface="+mn-lt"/>
                 <a:cs typeface="+mn-lt"/>
               </a:rPr>
@@ -8875,7 +8814,7 @@
               <a:t>- Consulta dos dados dos funcionários da empresa;</a:t>
             </a:r>
             <a:r>
-              <a:rPr lang="pt-PT" dirty="0">
+              <a:rPr lang="pt-PT">
                 <a:ea typeface="+mn-lt"/>
                 <a:cs typeface="+mn-lt"/>
               </a:rPr>
@@ -8895,7 +8834,7 @@
               <a:t>- Tratar grandes quantidades de dados;</a:t>
             </a:r>
             <a:r>
-              <a:rPr lang="pt-PT" dirty="0">
+              <a:rPr lang="pt-PT">
                 <a:ea typeface="+mn-lt"/>
                 <a:cs typeface="+mn-lt"/>
               </a:rPr>
@@ -8915,7 +8854,7 @@
               <a:t>O desenvolvimento do sistema proposto constitui uma grande responsabilidade, pois qualquer falha pode comprometer o futuro da empresa visto que podem perder muito dinheiro.</a:t>
             </a:r>
             <a:r>
-              <a:rPr lang="pt-PT" dirty="0">
+              <a:rPr lang="pt-PT">
                 <a:ea typeface="+mn-lt"/>
                 <a:cs typeface="+mn-lt"/>
               </a:rPr>
@@ -8977,13 +8916,13 @@
           <a:lstStyle/>
           <a:p>
             <a:r>
-              <a:rPr lang="pt-PT" dirty="0">
+              <a:rPr lang="pt-PT">
                 <a:ea typeface="+mj-lt"/>
                 <a:cs typeface="+mj-lt"/>
               </a:rPr>
               <a:t>1.3 Análise da viabilidade do processo</a:t>
             </a:r>
-            <a:endParaRPr lang="pt-PT" dirty="0"/>
+            <a:endParaRPr lang="pt-PT"/>
           </a:p>
         </p:txBody>
       </p:sp>
@@ -9021,7 +8960,7 @@
               <a:t>O Sr.Jefferson tem a certeza que se tiver uma base de dados mais eficiente, conseguirá:</a:t>
             </a:r>
             <a:r>
-              <a:rPr lang="pt-PT" dirty="0">
+              <a:rPr lang="pt-PT">
                 <a:ea typeface="+mn-lt"/>
                 <a:cs typeface="+mn-lt"/>
               </a:rPr>
@@ -9041,7 +8980,7 @@
               <a:t>- Aumentar o lucro por cerca de 10% logo no primeiro mês, isto suportará o custo do sistema.</a:t>
             </a:r>
             <a:r>
-              <a:rPr lang="pt-PT" dirty="0">
+              <a:rPr lang="pt-PT">
                 <a:ea typeface="+mn-lt"/>
                 <a:cs typeface="+mn-lt"/>
               </a:rPr>
@@ -9087,7 +9026,7 @@
               <a:t>- Conhecer o local de cada produto dentro do armazém.</a:t>
             </a:r>
             <a:r>
-              <a:rPr lang="pt-PT" dirty="0">
+              <a:rPr lang="pt-PT">
                 <a:ea typeface="+mn-lt"/>
                 <a:cs typeface="+mn-lt"/>
               </a:rPr>
@@ -9107,7 +9046,7 @@
               <a:t>- Saber o armazém mais perto com o produto adquirido por um cliente para a entrega mais rápida.</a:t>
             </a:r>
             <a:r>
-              <a:rPr lang="pt-PT" dirty="0">
+              <a:rPr lang="pt-PT">
                 <a:ea typeface="+mn-lt"/>
                 <a:cs typeface="+mn-lt"/>
               </a:rPr>
@@ -9169,13 +9108,13 @@
           <a:lstStyle/>
           <a:p>
             <a:r>
-              <a:rPr lang="pt-PT" dirty="0">
+              <a:rPr lang="pt-PT">
                 <a:ea typeface="+mj-lt"/>
                 <a:cs typeface="+mj-lt"/>
               </a:rPr>
               <a:t>1.4 Recursos e Equipa de Trabalho </a:t>
             </a:r>
-            <a:endParaRPr lang="pt-PT" dirty="0"/>
+            <a:endParaRPr lang="pt-PT"/>
           </a:p>
         </p:txBody>
       </p:sp>
@@ -9221,7 +9160,7 @@
               </a:rPr>
               <a:t> </a:t>
             </a:r>
-            <a:endParaRPr lang="pt-PT"/>
+            <a:endParaRPr lang="pt-PT" dirty="0"/>
           </a:p>
           <a:p>
             <a:pPr lvl="1"/>
@@ -9315,7 +9254,7 @@
                 <a:ea typeface="+mn-lt"/>
                 <a:cs typeface="+mn-lt"/>
               </a:rPr>
-              <a:t>Sr. Jefferson Bazos, Sr. Joaquim, Brenin Marrão, Tata Rovaris, Tigas Rodrigues</a:t>
+              <a:t>Sr. Jefferson Bazos, Brenin Marrão, Tata Rovaris, Tigas Rodrigues</a:t>
             </a:r>
             <a:endParaRPr lang="pt-PT"/>
           </a:p>
@@ -9397,7 +9336,7 @@
             <a:endParaRPr lang="pt-PT"/>
           </a:p>
           <a:p>
-            <a:endParaRPr lang="pt-PT" dirty="0">
+            <a:endParaRPr lang="pt-PT">
               <a:ea typeface="+mn-lt"/>
               <a:cs typeface="+mn-lt"/>
             </a:endParaRPr>
@@ -9456,13 +9395,13 @@
           <a:lstStyle/>
           <a:p>
             <a:r>
-              <a:rPr lang="pt-PT" dirty="0">
+              <a:rPr lang="pt-PT">
                 <a:ea typeface="+mj-lt"/>
                 <a:cs typeface="+mj-lt"/>
               </a:rPr>
               <a:t>1.5 Plano de Execução do Projeto</a:t>
             </a:r>
-            <a:endParaRPr lang="pt-PT" dirty="0"/>
+            <a:endParaRPr lang="pt-PT"/>
           </a:p>
         </p:txBody>
       </p:sp>
@@ -9490,15 +9429,45 @@
           <a:lstStyle/>
           <a:p>
             <a:r>
-              <a:rPr lang="pt-BR" dirty="0"/>
+              <a:rPr lang="pt-BR"/>
               <a:t>O DIAGRAMA DO GANTT</a:t>
             </a:r>
           </a:p>
           <a:p>
-            <a:endParaRPr lang="pt-BR" dirty="0"/>
-          </a:p>
-        </p:txBody>
-      </p:sp>
+            <a:endParaRPr lang="pt-BR"/>
+          </a:p>
+        </p:txBody>
+      </p:sp>
+      <p:pic>
+        <p:nvPicPr>
+          <p:cNvPr id="4" name="Picture 4" descr="Chart, scatter chart&#10;&#10;Description automatically generated">
+            <a:extLst>
+              <a:ext uri="{FF2B5EF4-FFF2-40B4-BE49-F238E27FC236}">
+                <a16:creationId xmlns:a16="http://schemas.microsoft.com/office/drawing/2014/main" id="{999648C3-A164-FB98-E23D-29853273038B}"/>
+              </a:ext>
+            </a:extLst>
+          </p:cNvPr>
+          <p:cNvPicPr>
+            <a:picLocks noChangeAspect="1"/>
+          </p:cNvPicPr>
+          <p:nvPr/>
+        </p:nvPicPr>
+        <p:blipFill>
+          <a:blip r:embed="rId2"/>
+          <a:stretch>
+            <a:fillRect/>
+          </a:stretch>
+        </p:blipFill>
+        <p:spPr>
+          <a:xfrm>
+            <a:off x="562708" y="2051196"/>
+            <a:ext cx="9308123" cy="4045143"/>
+          </a:xfrm>
+          <a:prstGeom prst="rect">
+            <a:avLst/>
+          </a:prstGeom>
+        </p:spPr>
+      </p:pic>
     </p:spTree>
     <p:extLst>
       <p:ext uri="{BB962C8B-B14F-4D97-AF65-F5344CB8AC3E}">
@@ -9702,7 +9671,7 @@
           <a:lstStyle/>
           <a:p>
             <a:r>
-              <a:rPr lang="pt-BR" dirty="0">
+              <a:rPr lang="pt-BR">
                 <a:ea typeface="+mn-lt"/>
                 <a:cs typeface="+mn-lt"/>
               </a:rPr>
@@ -9712,35 +9681,35 @@
           <a:p>
             <a:pPr lvl="1"/>
             <a:r>
-              <a:rPr lang="pt-BR" dirty="0">
+              <a:rPr lang="pt-BR">
                 <a:ea typeface="+mn-lt"/>
                 <a:cs typeface="+mn-lt"/>
               </a:rPr>
               <a:t>Entrevistas/</a:t>
             </a:r>
             <a:r>
-              <a:rPr lang="pt-PT" dirty="0">
+              <a:rPr lang="pt-PT">
                 <a:ea typeface="+mn-lt"/>
                 <a:cs typeface="+mn-lt"/>
               </a:rPr>
               <a:t>reuniões</a:t>
             </a:r>
             <a:r>
-              <a:rPr lang="pt-BR" dirty="0">
+              <a:rPr lang="pt-BR">
                 <a:ea typeface="+mn-lt"/>
                 <a:cs typeface="+mn-lt"/>
               </a:rPr>
               <a:t> com Jefferson </a:t>
             </a:r>
             <a:r>
-              <a:rPr lang="pt-BR" dirty="0" err="1">
+              <a:rPr lang="pt-BR" err="1">
                 <a:ea typeface="+mn-lt"/>
                 <a:cs typeface="+mn-lt"/>
               </a:rPr>
               <a:t>Bazos</a:t>
             </a:r>
             <a:r>
-              <a:rPr lang="pt-BR" dirty="0">
+              <a:rPr lang="pt-BR">
                 <a:ea typeface="+mn-lt"/>
                 <a:cs typeface="+mn-lt"/>
               </a:rPr>
@@ -9750,21 +9719,21 @@
           <a:p>
             <a:pPr lvl="1"/>
             <a:r>
-              <a:rPr lang="pt-BR" dirty="0">
+              <a:rPr lang="pt-BR">
                 <a:ea typeface="+mn-lt"/>
                 <a:cs typeface="+mn-lt"/>
               </a:rPr>
               <a:t> A análise da documentação gerada por cada </a:t>
             </a:r>
             <a:r>
-              <a:rPr lang="pt-PT" dirty="0">
+              <a:rPr lang="pt-PT">
                 <a:ea typeface="+mn-lt"/>
                 <a:cs typeface="+mn-lt"/>
               </a:rPr>
               <a:t>armazém</a:t>
             </a:r>
             <a:r>
-              <a:rPr lang="pt-BR" dirty="0">
+              <a:rPr lang="pt-BR">
                 <a:ea typeface="+mn-lt"/>
                 <a:cs typeface="+mn-lt"/>
               </a:rPr>
@@ -9774,24 +9743,24 @@
           <a:p>
             <a:pPr lvl="1"/>
             <a:r>
-              <a:rPr lang="pt-BR" dirty="0">
+              <a:rPr lang="pt-BR">
                 <a:ea typeface="+mn-lt"/>
                 <a:cs typeface="+mn-lt"/>
               </a:rPr>
               <a:t> A observação dos processos em cada armazém ;</a:t>
             </a:r>
-            <a:endParaRPr lang="pt-BR" dirty="0"/>
+            <a:endParaRPr lang="pt-BR"/>
           </a:p>
           <a:p>
             <a:pPr lvl="1"/>
             <a:r>
-              <a:rPr lang="pt-BR" dirty="0">
+              <a:rPr lang="pt-BR">
                 <a:ea typeface="+mn-lt"/>
                 <a:cs typeface="+mn-lt"/>
               </a:rPr>
               <a:t> Questionários aos clientes e funcionários .</a:t>
             </a:r>
-            <a:endParaRPr lang="pt-BR" dirty="0"/>
+            <a:endParaRPr lang="pt-BR"/>
           </a:p>
         </p:txBody>
       </p:sp>

</xml_diff>